<commit_message>
Finalizadas aulas 4, 5 e 6 da seção IoT
</commit_message>
<xml_diff>
--- a/IoT/Aula 04 - Atuadores Básicos/Aula 04 - Atuadores Básicos.pptx
+++ b/IoT/Aula 04 - Atuadores Básicos/Aula 04 - Atuadores Básicos.pptx
@@ -241,7 +241,7 @@
             <a:fld id="{4EA5E1ED-E65E-440E-8A4B-5F5DC973F797}" type="datetimeFigureOut">
               <a:rPr lang="pt-BR" smtClean="0"/>
               <a:pPr/>
-              <a:t>06/08/2023</a:t>
+              <a:t>14/08/2023</a:t>
             </a:fld>
             <a:endParaRPr lang="pt-BR"/>
           </a:p>
@@ -998,7 +998,7 @@
           <a:p>
             <a:fld id="{1787AD07-0C2A-424C-83EF-FCCF4A0D3BA0}" type="datetime1">
               <a:rPr lang="pt-BR" smtClean="0"/>
-              <a:t>06/08/2023</a:t>
+              <a:t>14/08/2023</a:t>
             </a:fld>
             <a:endParaRPr lang="pt-BR"/>
           </a:p>
@@ -1167,7 +1167,7 @@
           <a:p>
             <a:fld id="{2F92FB66-59C8-46A5-AD82-5DAAFD2DC390}" type="datetime1">
               <a:rPr lang="pt-BR" smtClean="0"/>
-              <a:t>06/08/2023</a:t>
+              <a:t>14/08/2023</a:t>
             </a:fld>
             <a:endParaRPr lang="pt-BR"/>
           </a:p>
@@ -1346,7 +1346,7 @@
           <a:p>
             <a:fld id="{3D5CC8D2-C61E-4471-AD68-1C0D45A8EAFC}" type="datetime1">
               <a:rPr lang="pt-BR" smtClean="0"/>
-              <a:t>06/08/2023</a:t>
+              <a:t>14/08/2023</a:t>
             </a:fld>
             <a:endParaRPr lang="pt-BR"/>
           </a:p>
@@ -1489,7 +1489,7 @@
           <a:p>
             <a:fld id="{C3E38981-C08A-4A29-B885-392FB4EE0709}" type="datetime1">
               <a:rPr lang="pt-BR" smtClean="0"/>
-              <a:t>06/08/2023</a:t>
+              <a:t>14/08/2023</a:t>
             </a:fld>
             <a:endParaRPr lang="en-US" dirty="0"/>
           </a:p>
@@ -1874,7 +1874,7 @@
           <a:p>
             <a:fld id="{2CFE63D7-5B4A-40A4-8FD4-EA63D1010EB7}" type="datetime1">
               <a:rPr lang="pt-BR" smtClean="0"/>
-              <a:t>06/08/2023</a:t>
+              <a:t>14/08/2023</a:t>
             </a:fld>
             <a:endParaRPr lang="en-US" dirty="0"/>
           </a:p>
@@ -2096,7 +2096,7 @@
           <a:p>
             <a:fld id="{A9719147-5557-4D76-A2C3-BF25882771D2}" type="datetime1">
               <a:rPr lang="pt-BR" smtClean="0"/>
-              <a:t>06/08/2023</a:t>
+              <a:t>14/08/2023</a:t>
             </a:fld>
             <a:endParaRPr lang="en-US" dirty="0"/>
           </a:p>
@@ -2409,7 +2409,7 @@
           <a:p>
             <a:fld id="{66250340-7104-44A8-88A9-88532CCE9C1C}" type="datetime1">
               <a:rPr lang="pt-BR" smtClean="0"/>
-              <a:t>06/08/2023</a:t>
+              <a:t>14/08/2023</a:t>
             </a:fld>
             <a:endParaRPr lang="en-US" dirty="0"/>
           </a:p>
@@ -2594,7 +2594,7 @@
           <a:p>
             <a:fld id="{D047EA32-7810-48BE-A9BB-EA3D8AA5AD34}" type="datetime1">
               <a:rPr lang="pt-BR" smtClean="0"/>
-              <a:t>06/08/2023</a:t>
+              <a:t>14/08/2023</a:t>
             </a:fld>
             <a:endParaRPr lang="en-US" dirty="0"/>
           </a:p>
@@ -2742,7 +2742,7 @@
           <a:p>
             <a:fld id="{7C28E9E9-B91F-400E-BE43-87BB4B5C6F4E}" type="datetime1">
               <a:rPr lang="pt-BR" smtClean="0"/>
-              <a:t>06/08/2023</a:t>
+              <a:t>14/08/2023</a:t>
             </a:fld>
             <a:endParaRPr lang="en-US" dirty="0"/>
           </a:p>
@@ -2994,7 +2994,7 @@
           <a:p>
             <a:fld id="{A9E773EA-BFD5-41D4-8CCD-2C9F67DAB481}" type="datetime1">
               <a:rPr lang="pt-BR" smtClean="0"/>
-              <a:t>06/08/2023</a:t>
+              <a:t>14/08/2023</a:t>
             </a:fld>
             <a:endParaRPr lang="pt-BR" dirty="0"/>
           </a:p>
@@ -3196,7 +3196,7 @@
           <a:p>
             <a:fld id="{DAA7C8B6-CF57-4A95-AF6C-A77E6C230ED3}" type="datetime1">
               <a:rPr lang="pt-BR" smtClean="0"/>
-              <a:t>06/08/2023</a:t>
+              <a:t>14/08/2023</a:t>
             </a:fld>
             <a:endParaRPr lang="pt-BR"/>
           </a:p>
@@ -3480,7 +3480,7 @@
           <a:p>
             <a:fld id="{34D50989-24C8-4023-9B0D-A6D249548FD9}" type="datetime1">
               <a:rPr lang="pt-BR" smtClean="0"/>
-              <a:t>06/08/2023</a:t>
+              <a:t>14/08/2023</a:t>
             </a:fld>
             <a:endParaRPr lang="pt-BR"/>
           </a:p>
@@ -3716,7 +3716,7 @@
           <a:p>
             <a:fld id="{8D9BC96A-9776-4585-A439-BC9E2DA226C1}" type="datetime1">
               <a:rPr lang="pt-BR" smtClean="0"/>
-              <a:t>06/08/2023</a:t>
+              <a:t>14/08/2023</a:t>
             </a:fld>
             <a:endParaRPr lang="pt-BR"/>
           </a:p>
@@ -4099,7 +4099,7 @@
           <a:p>
             <a:fld id="{7D12BE36-2922-4567-BD67-201EFA21BF6D}" type="datetime1">
               <a:rPr lang="pt-BR" smtClean="0"/>
-              <a:t>06/08/2023</a:t>
+              <a:t>14/08/2023</a:t>
             </a:fld>
             <a:endParaRPr lang="pt-BR"/>
           </a:p>
@@ -4211,7 +4211,7 @@
           <a:p>
             <a:fld id="{E5B462A9-4B1E-4013-BFB1-FC92225AC2F2}" type="datetime1">
               <a:rPr lang="pt-BR" smtClean="0"/>
-              <a:t>06/08/2023</a:t>
+              <a:t>14/08/2023</a:t>
             </a:fld>
             <a:endParaRPr lang="pt-BR"/>
           </a:p>
@@ -4295,7 +4295,7 @@
           <a:p>
             <a:fld id="{D0E6EC7A-67E7-4978-9BAE-C8F82A40B13B}" type="datetime1">
               <a:rPr lang="pt-BR" smtClean="0"/>
-              <a:t>06/08/2023</a:t>
+              <a:t>14/08/2023</a:t>
             </a:fld>
             <a:endParaRPr lang="pt-BR"/>
           </a:p>
@@ -4577,7 +4577,7 @@
           <a:p>
             <a:fld id="{6E085A4E-80B8-47DD-9D9B-8E1B205CBB30}" type="datetime1">
               <a:rPr lang="pt-BR" smtClean="0"/>
-              <a:t>06/08/2023</a:t>
+              <a:t>14/08/2023</a:t>
             </a:fld>
             <a:endParaRPr lang="pt-BR"/>
           </a:p>
@@ -4836,7 +4836,7 @@
           <a:p>
             <a:fld id="{F4E9A02C-D9AD-4B8C-9B93-B0980E8E86EB}" type="datetime1">
               <a:rPr lang="pt-BR" smtClean="0"/>
-              <a:t>06/08/2023</a:t>
+              <a:t>14/08/2023</a:t>
             </a:fld>
             <a:endParaRPr lang="pt-BR"/>
           </a:p>
@@ -5048,7 +5048,7 @@
           <a:p>
             <a:fld id="{202762D0-3A59-4B14-83BA-8E0FC8A60AB1}" type="datetime1">
               <a:rPr lang="pt-BR" smtClean="0"/>
-              <a:t>06/08/2023</a:t>
+              <a:t>14/08/2023</a:t>
             </a:fld>
             <a:endParaRPr lang="pt-BR"/>
           </a:p>

</xml_diff>